<commit_message>
Updated slides with labels
</commit_message>
<xml_diff>
--- a/Presentation.pptx
+++ b/Presentation.pptx
@@ -6375,10 +6375,10 @@
       </p:sp>
       <p:pic>
         <p:nvPicPr>
-          <p:cNvPr id="6" name="Picture 5">
-            <a:extLst>
-              <a:ext uri="{FF2B5EF4-FFF2-40B4-BE49-F238E27FC236}">
-                <a16:creationId xmlns:a16="http://schemas.microsoft.com/office/drawing/2014/main" id="{17787B65-BD3E-4FB1-ADCA-E5FF4F87D27C}"/>
+          <p:cNvPr id="3" name="Picture 2">
+            <a:extLst>
+              <a:ext uri="{FF2B5EF4-FFF2-40B4-BE49-F238E27FC236}">
+                <a16:creationId xmlns:a16="http://schemas.microsoft.com/office/drawing/2014/main" id="{EA54B71E-AAFF-4701-90A6-ECB739295D4D}"/>
               </a:ext>
             </a:extLst>
           </p:cNvPr>
@@ -6395,8 +6395,8 @@
         </p:blipFill>
         <p:spPr>
           <a:xfrm>
-            <a:off x="3498552" y="1454668"/>
-            <a:ext cx="5194896" cy="5020570"/>
+            <a:off x="3398714" y="1386672"/>
+            <a:ext cx="5394571" cy="5025652"/>
           </a:xfrm>
           <a:prstGeom prst="rect">
             <a:avLst/>
@@ -6657,10 +6657,10 @@
       </p:sp>
       <p:pic>
         <p:nvPicPr>
-          <p:cNvPr id="5" name="Picture 4">
-            <a:extLst>
-              <a:ext uri="{FF2B5EF4-FFF2-40B4-BE49-F238E27FC236}">
-                <a16:creationId xmlns:a16="http://schemas.microsoft.com/office/drawing/2014/main" id="{6C4D04BE-AD32-4B28-91BD-58577613C85D}"/>
+          <p:cNvPr id="3" name="Picture 2">
+            <a:extLst>
+              <a:ext uri="{FF2B5EF4-FFF2-40B4-BE49-F238E27FC236}">
+                <a16:creationId xmlns:a16="http://schemas.microsoft.com/office/drawing/2014/main" id="{43310ACD-C52F-40CD-A387-B4253E0C86B3}"/>
               </a:ext>
             </a:extLst>
           </p:cNvPr>
@@ -6677,8 +6677,8 @@
         </p:blipFill>
         <p:spPr>
           <a:xfrm>
-            <a:off x="3423328" y="1416440"/>
-            <a:ext cx="5345344" cy="4984359"/>
+            <a:off x="3316268" y="1316334"/>
+            <a:ext cx="5559463" cy="5176541"/>
           </a:xfrm>
           <a:prstGeom prst="rect">
             <a:avLst/>
@@ -6939,10 +6939,10 @@
       </p:sp>
       <p:pic>
         <p:nvPicPr>
-          <p:cNvPr id="3" name="Picture 2">
-            <a:extLst>
-              <a:ext uri="{FF2B5EF4-FFF2-40B4-BE49-F238E27FC236}">
-                <a16:creationId xmlns:a16="http://schemas.microsoft.com/office/drawing/2014/main" id="{85CB9D72-9AB0-4782-8EEE-1FA5340BF4F1}"/>
+          <p:cNvPr id="5" name="Picture 4">
+            <a:extLst>
+              <a:ext uri="{FF2B5EF4-FFF2-40B4-BE49-F238E27FC236}">
+                <a16:creationId xmlns:a16="http://schemas.microsoft.com/office/drawing/2014/main" id="{59B82E1F-6D77-4534-83E7-082280075BB5}"/>
               </a:ext>
             </a:extLst>
           </p:cNvPr>
@@ -6959,8 +6959,8 @@
         </p:blipFill>
         <p:spPr>
           <a:xfrm>
-            <a:off x="2791818" y="1305762"/>
-            <a:ext cx="5709087" cy="5187113"/>
+            <a:off x="2943967" y="1294248"/>
+            <a:ext cx="5379480" cy="5222251"/>
           </a:xfrm>
           <a:prstGeom prst="rect">
             <a:avLst/>
@@ -7221,10 +7221,10 @@
       </p:sp>
       <p:pic>
         <p:nvPicPr>
-          <p:cNvPr id="5" name="Picture 4">
-            <a:extLst>
-              <a:ext uri="{FF2B5EF4-FFF2-40B4-BE49-F238E27FC236}">
-                <a16:creationId xmlns:a16="http://schemas.microsoft.com/office/drawing/2014/main" id="{E1FC95FC-C314-4641-B237-A1294BBD04AC}"/>
+          <p:cNvPr id="3" name="Picture 2">
+            <a:extLst>
+              <a:ext uri="{FF2B5EF4-FFF2-40B4-BE49-F238E27FC236}">
+                <a16:creationId xmlns:a16="http://schemas.microsoft.com/office/drawing/2014/main" id="{A4597BC0-1F51-4930-86B1-FF3038207D51}"/>
               </a:ext>
             </a:extLst>
           </p:cNvPr>
@@ -7241,8 +7241,8 @@
         </p:blipFill>
         <p:spPr>
           <a:xfrm>
-            <a:off x="3390621" y="1487620"/>
-            <a:ext cx="5410758" cy="4977622"/>
+            <a:off x="3270309" y="1368197"/>
+            <a:ext cx="5651381" cy="5124678"/>
           </a:xfrm>
           <a:prstGeom prst="rect">
             <a:avLst/>
@@ -7426,7 +7426,16 @@
               <a:rPr lang="en-US" sz="2400" dirty="0">
                 <a:latin typeface="Avenir Next LT Pro" panose="020B0504020202020204" pitchFamily="34" charset="0"/>
               </a:rPr>
-              <a:t>Pick up and drop off locations changed</a:t>
+              <a:t>Pick up and drop off locations </a:t>
+            </a:r>
+            <a:r>
+              <a:rPr lang="en-US" sz="2400" dirty="0">
+                <a:solidFill>
+                  <a:srgbClr val="FF0000"/>
+                </a:solidFill>
+                <a:latin typeface="Avenir Next LT Pro" panose="020B0504020202020204" pitchFamily="34" charset="0"/>
+              </a:rPr>
+              <a:t>changed</a:t>
             </a:r>
           </a:p>
         </p:txBody>
@@ -7986,10 +7995,10 @@
       </p:sp>
       <p:pic>
         <p:nvPicPr>
-          <p:cNvPr id="6" name="Picture 5">
-            <a:extLst>
-              <a:ext uri="{FF2B5EF4-FFF2-40B4-BE49-F238E27FC236}">
-                <a16:creationId xmlns:a16="http://schemas.microsoft.com/office/drawing/2014/main" id="{0F236B9D-195F-4A9F-A9F5-F7586032D869}"/>
+          <p:cNvPr id="3" name="Picture 2">
+            <a:extLst>
+              <a:ext uri="{FF2B5EF4-FFF2-40B4-BE49-F238E27FC236}">
+                <a16:creationId xmlns:a16="http://schemas.microsoft.com/office/drawing/2014/main" id="{3E80CEA8-7D30-4234-9981-775B270BB408}"/>
               </a:ext>
             </a:extLst>
           </p:cNvPr>
@@ -8006,8 +8015,8 @@
         </p:blipFill>
         <p:spPr>
           <a:xfrm>
-            <a:off x="3476164" y="1523145"/>
-            <a:ext cx="5239672" cy="4958862"/>
+            <a:off x="3344597" y="1354068"/>
+            <a:ext cx="5502805" cy="5138807"/>
           </a:xfrm>
           <a:prstGeom prst="rect">
             <a:avLst/>
@@ -8268,10 +8277,10 @@
       </p:sp>
       <p:pic>
         <p:nvPicPr>
-          <p:cNvPr id="3" name="Picture 2">
-            <a:extLst>
-              <a:ext uri="{FF2B5EF4-FFF2-40B4-BE49-F238E27FC236}">
-                <a16:creationId xmlns:a16="http://schemas.microsoft.com/office/drawing/2014/main" id="{48FD5099-03C3-4B0E-A8D0-526B7E83875B}"/>
+          <p:cNvPr id="5" name="Picture 4">
+            <a:extLst>
+              <a:ext uri="{FF2B5EF4-FFF2-40B4-BE49-F238E27FC236}">
+                <a16:creationId xmlns:a16="http://schemas.microsoft.com/office/drawing/2014/main" id="{C6293BA4-0827-4A17-BC6D-7DDACBB84AAD}"/>
               </a:ext>
             </a:extLst>
           </p:cNvPr>
@@ -8288,8 +8297,8 @@
         </p:blipFill>
         <p:spPr>
           <a:xfrm>
-            <a:off x="3412516" y="1325742"/>
-            <a:ext cx="5366967" cy="5167133"/>
+            <a:off x="3424194" y="1403385"/>
+            <a:ext cx="5343611" cy="5089490"/>
           </a:xfrm>
           <a:prstGeom prst="rect">
             <a:avLst/>
@@ -8550,10 +8559,10 @@
       </p:sp>
       <p:pic>
         <p:nvPicPr>
-          <p:cNvPr id="5" name="Picture 4">
-            <a:extLst>
-              <a:ext uri="{FF2B5EF4-FFF2-40B4-BE49-F238E27FC236}">
-                <a16:creationId xmlns:a16="http://schemas.microsoft.com/office/drawing/2014/main" id="{A351F322-CACE-4155-80B9-08AF2E7938EB}"/>
+          <p:cNvPr id="3" name="Picture 2">
+            <a:extLst>
+              <a:ext uri="{FF2B5EF4-FFF2-40B4-BE49-F238E27FC236}">
+                <a16:creationId xmlns:a16="http://schemas.microsoft.com/office/drawing/2014/main" id="{6FA6D7C0-CEE4-42CE-A8B7-D52179347CD2}"/>
               </a:ext>
             </a:extLst>
           </p:cNvPr>
@@ -8570,8 +8579,8 @@
         </p:blipFill>
         <p:spPr>
           <a:xfrm>
-            <a:off x="838200" y="1738748"/>
-            <a:ext cx="4710117" cy="4523398"/>
+            <a:off x="530678" y="1690688"/>
+            <a:ext cx="4832820" cy="4657411"/>
           </a:xfrm>
           <a:prstGeom prst="rect">
             <a:avLst/>
@@ -8580,10 +8589,10 @@
       </p:pic>
       <p:pic>
         <p:nvPicPr>
-          <p:cNvPr id="6" name="Picture 5">
-            <a:extLst>
-              <a:ext uri="{FF2B5EF4-FFF2-40B4-BE49-F238E27FC236}">
-                <a16:creationId xmlns:a16="http://schemas.microsoft.com/office/drawing/2014/main" id="{AD554752-A9E0-46B1-A7BF-7D0E8C311258}"/>
+          <p:cNvPr id="8" name="Picture 7">
+            <a:extLst>
+              <a:ext uri="{FF2B5EF4-FFF2-40B4-BE49-F238E27FC236}">
+                <a16:creationId xmlns:a16="http://schemas.microsoft.com/office/drawing/2014/main" id="{FC5879C0-41AF-43B2-A7F5-D6D9169895CF}"/>
               </a:ext>
             </a:extLst>
           </p:cNvPr>
@@ -8600,8 +8609,8 @@
         </p:blipFill>
         <p:spPr>
           <a:xfrm>
-            <a:off x="6374496" y="1747459"/>
-            <a:ext cx="4710118" cy="4546446"/>
+            <a:off x="6096000" y="1690688"/>
+            <a:ext cx="4784267" cy="4657411"/>
           </a:xfrm>
           <a:prstGeom prst="rect">
             <a:avLst/>

</xml_diff>